<commit_message>
A part of Primer
</commit_message>
<xml_diff>
--- a/A BLE-based multi-gateway network infrastructure with handover support for mobile BLE peripherals.pptx
+++ b/A BLE-based multi-gateway network infrastructure with handover support for mobile BLE peripherals.pptx
@@ -8,11 +8,13 @@
     <p:sldId id="256" r:id="rId2"/>
     <p:sldId id="257" r:id="rId3"/>
     <p:sldId id="259" r:id="rId4"/>
-    <p:sldId id="260" r:id="rId5"/>
-    <p:sldId id="261" r:id="rId6"/>
-    <p:sldId id="262" r:id="rId7"/>
-    <p:sldId id="263" r:id="rId8"/>
-    <p:sldId id="258" r:id="rId9"/>
+    <p:sldId id="264" r:id="rId5"/>
+    <p:sldId id="265" r:id="rId6"/>
+    <p:sldId id="260" r:id="rId7"/>
+    <p:sldId id="261" r:id="rId8"/>
+    <p:sldId id="262" r:id="rId9"/>
+    <p:sldId id="263" r:id="rId10"/>
+    <p:sldId id="258" r:id="rId11"/>
   </p:sldIdLst>
   <p:sldSz cx="12192000" cy="6858000"/>
   <p:notesSz cx="6858000" cy="9144000"/>
@@ -3425,6 +3427,197 @@
 </p:sld>
 </file>
 
+<file path=ppt/slides/slide10.xml><?xml version="1.0" encoding="utf-8"?>
+<p:sld xmlns:a="http://schemas.openxmlformats.org/drawingml/2006/main" xmlns:r="http://schemas.openxmlformats.org/officeDocument/2006/relationships" xmlns:p="http://schemas.openxmlformats.org/presentationml/2006/main">
+  <p:cSld>
+    <p:spTree>
+      <p:nvGrpSpPr>
+        <p:cNvPr id="1" name=""/>
+        <p:cNvGrpSpPr/>
+        <p:nvPr/>
+      </p:nvGrpSpPr>
+      <p:grpSpPr>
+        <a:xfrm>
+          <a:off x="0" y="0"/>
+          <a:ext cx="0" cy="0"/>
+          <a:chOff x="0" y="0"/>
+          <a:chExt cx="0" cy="0"/>
+        </a:xfrm>
+      </p:grpSpPr>
+      <p:sp>
+        <p:nvSpPr>
+          <p:cNvPr id="2" name="標題 1">
+            <a:extLst>
+              <a:ext uri="{FF2B5EF4-FFF2-40B4-BE49-F238E27FC236}">
+                <a16:creationId xmlns:a16="http://schemas.microsoft.com/office/drawing/2014/main" id="{66BD44E2-EFFF-43D9-A213-DE501B575689}"/>
+              </a:ext>
+            </a:extLst>
+          </p:cNvPr>
+          <p:cNvSpPr>
+            <a:spLocks noGrp="1"/>
+          </p:cNvSpPr>
+          <p:nvPr>
+            <p:ph type="title"/>
+          </p:nvPr>
+        </p:nvSpPr>
+        <p:spPr/>
+        <p:txBody>
+          <a:bodyPr/>
+          <a:lstStyle/>
+          <a:p>
+            <a:r>
+              <a:rPr lang="en-US" altLang="zh-TW" dirty="0"/>
+              <a:t>References</a:t>
+            </a:r>
+            <a:endParaRPr lang="zh-TW" altLang="en-US" dirty="0"/>
+          </a:p>
+        </p:txBody>
+      </p:sp>
+      <p:sp>
+        <p:nvSpPr>
+          <p:cNvPr id="3" name="內容版面配置區 2">
+            <a:extLst>
+              <a:ext uri="{FF2B5EF4-FFF2-40B4-BE49-F238E27FC236}">
+                <a16:creationId xmlns:a16="http://schemas.microsoft.com/office/drawing/2014/main" id="{6C6870F8-5E25-41B8-BDBD-DC2867167899}"/>
+              </a:ext>
+            </a:extLst>
+          </p:cNvPr>
+          <p:cNvSpPr>
+            <a:spLocks noGrp="1"/>
+          </p:cNvSpPr>
+          <p:nvPr>
+            <p:ph idx="1"/>
+          </p:nvPr>
+        </p:nvSpPr>
+        <p:spPr/>
+        <p:txBody>
+          <a:bodyPr>
+            <a:normAutofit/>
+          </a:bodyPr>
+          <a:lstStyle/>
+          <a:p>
+            <a:r>
+              <a:rPr lang="en-US" altLang="zh-TW" dirty="0"/>
+              <a:t>Mathias </a:t>
+            </a:r>
+            <a:r>
+              <a:rPr lang="en-US" altLang="zh-TW" dirty="0" err="1"/>
+              <a:t>Baert</a:t>
+            </a:r>
+            <a:r>
+              <a:rPr lang="en-US" altLang="zh-TW" dirty="0"/>
+              <a:t>, </a:t>
+            </a:r>
+            <a:r>
+              <a:rPr lang="en-US" altLang="zh-TW" dirty="0" err="1"/>
+              <a:t>Pieterjan</a:t>
+            </a:r>
+            <a:r>
+              <a:rPr lang="en-US" altLang="zh-TW" dirty="0"/>
+              <a:t> </a:t>
+            </a:r>
+            <a:r>
+              <a:rPr lang="en-US" altLang="zh-TW" dirty="0" err="1"/>
+              <a:t>Camerlynck</a:t>
+            </a:r>
+            <a:r>
+              <a:rPr lang="en-US" altLang="zh-TW" dirty="0"/>
+              <a:t>, Pieter </a:t>
+            </a:r>
+            <a:r>
+              <a:rPr lang="en-US" altLang="zh-TW" dirty="0" err="1"/>
+              <a:t>Crombez</a:t>
+            </a:r>
+            <a:r>
+              <a:rPr lang="en-US" altLang="zh-TW" dirty="0"/>
+              <a:t>, Jeroen </a:t>
+            </a:r>
+            <a:r>
+              <a:rPr lang="en-US" altLang="zh-TW" dirty="0" err="1"/>
+              <a:t>Hoebeke</a:t>
+            </a:r>
+            <a:r>
+              <a:rPr lang="en-US" altLang="zh-TW" dirty="0"/>
+              <a:t>, “A BLE-Based Multi-Gateway Network Infrastructure with Handover Support for Mobile BLE Peripherals” </a:t>
+            </a:r>
+            <a:r>
+              <a:rPr lang="en-US" altLang="zh-TW" i="1" dirty="0"/>
+              <a:t>in IEEE </a:t>
+            </a:r>
+            <a:r>
+              <a:rPr lang="en-US" altLang="zh-TW" i="1" dirty="0" err="1"/>
+              <a:t>Internatonal</a:t>
+            </a:r>
+            <a:r>
+              <a:rPr lang="en-US" altLang="zh-TW" i="1" dirty="0"/>
+              <a:t> Conference on Mobile </a:t>
+            </a:r>
+            <a:r>
+              <a:rPr lang="en-US" altLang="zh-TW" i="1" dirty="0" err="1"/>
+              <a:t>Adhoc</a:t>
+            </a:r>
+            <a:r>
+              <a:rPr lang="en-US" altLang="zh-TW" i="1" dirty="0"/>
+              <a:t> and Sensor </a:t>
+            </a:r>
+            <a:r>
+              <a:rPr lang="en-US" altLang="zh-TW" i="1"/>
+              <a:t>Systems (IEEE MASS 2019) </a:t>
+            </a:r>
+            <a:r>
+              <a:rPr lang="en-US" altLang="zh-TW" dirty="0"/>
+              <a:t>, DOI: 10.1109/MASS.2019.00020</a:t>
+            </a:r>
+          </a:p>
+          <a:p>
+            <a:endParaRPr lang="en-US" altLang="zh-TW" dirty="0"/>
+          </a:p>
+          <a:p>
+            <a:r>
+              <a:rPr lang="en-US" altLang="zh-TW" dirty="0"/>
+              <a:t>M. </a:t>
+            </a:r>
+            <a:r>
+              <a:rPr lang="en-US" altLang="zh-TW" dirty="0" err="1"/>
+              <a:t>Nikodem</a:t>
+            </a:r>
+            <a:r>
+              <a:rPr lang="en-US" altLang="zh-TW" dirty="0"/>
+              <a:t>, M. </a:t>
+            </a:r>
+            <a:r>
+              <a:rPr lang="en-US" altLang="zh-TW" dirty="0" err="1"/>
+              <a:t>Bawiec</a:t>
+            </a:r>
+            <a:r>
+              <a:rPr lang="en-US" altLang="zh-TW" dirty="0"/>
+              <a:t>, “Experimental Evaluation of Advertisement-Based Bluetooth Low Energy Communication”, </a:t>
+            </a:r>
+            <a:r>
+              <a:rPr lang="en-US" altLang="zh-TW" i="1" dirty="0"/>
+              <a:t>MDPI Sensors 2020</a:t>
+            </a:r>
+            <a:r>
+              <a:rPr lang="en-US" altLang="zh-TW" dirty="0"/>
+              <a:t>, DOI:10.3390/s20010107</a:t>
+            </a:r>
+            <a:endParaRPr lang="zh-TW" altLang="en-US" dirty="0"/>
+          </a:p>
+        </p:txBody>
+      </p:sp>
+    </p:spTree>
+    <p:extLst>
+      <p:ext uri="{BB962C8B-B14F-4D97-AF65-F5344CB8AC3E}">
+        <p14:creationId xmlns:p14="http://schemas.microsoft.com/office/powerpoint/2010/main" val="2779116832"/>
+      </p:ext>
+    </p:extLst>
+  </p:cSld>
+  <p:clrMapOvr>
+    <a:masterClrMapping/>
+  </p:clrMapOvr>
+</p:sld>
+</file>
+
 <file path=ppt/slides/slide2.xml><?xml version="1.0" encoding="utf-8"?>
 <p:sld xmlns:a="http://schemas.openxmlformats.org/drawingml/2006/main" xmlns:r="http://schemas.openxmlformats.org/officeDocument/2006/relationships" xmlns:p="http://schemas.openxmlformats.org/presentationml/2006/main">
   <p:cSld>
@@ -3671,7 +3864,7 @@
           <p:cNvPr id="2" name="標題 1">
             <a:extLst>
               <a:ext uri="{FF2B5EF4-FFF2-40B4-BE49-F238E27FC236}">
-                <a16:creationId xmlns:a16="http://schemas.microsoft.com/office/drawing/2014/main" id="{B7DB5FDF-E9A2-4D3D-ACF8-CEFDE567ED4E}"/>
+                <a16:creationId xmlns:a16="http://schemas.microsoft.com/office/drawing/2014/main" id="{14B7E57E-D063-41EF-A857-5628A20B75BC}"/>
               </a:ext>
             </a:extLst>
           </p:cNvPr>
@@ -3689,9 +3882,8 @@
           <a:p>
             <a:r>
               <a:rPr lang="en-US" altLang="zh-TW" dirty="0"/>
-              <a:t>Conclusion</a:t>
-            </a:r>
-            <a:endParaRPr lang="zh-TW" altLang="en-US" dirty="0"/>
+              <a:t>Primer on BLE and BLE over IPv6</a:t>
+            </a:r>
           </a:p>
         </p:txBody>
       </p:sp>
@@ -3700,7 +3892,7 @@
           <p:cNvPr id="3" name="內容版面配置區 2">
             <a:extLst>
               <a:ext uri="{FF2B5EF4-FFF2-40B4-BE49-F238E27FC236}">
-                <a16:creationId xmlns:a16="http://schemas.microsoft.com/office/drawing/2014/main" id="{24BC7DE2-9247-4111-B9E4-01812FC553D6}"/>
+                <a16:creationId xmlns:a16="http://schemas.microsoft.com/office/drawing/2014/main" id="{E616DA40-9E29-4C7C-A28F-3857701A0286}"/>
               </a:ext>
             </a:extLst>
           </p:cNvPr>
@@ -3713,12 +3905,14 @@
         </p:nvSpPr>
         <p:spPr/>
         <p:txBody>
-          <a:bodyPr/>
+          <a:bodyPr>
+            <a:normAutofit fontScale="92500" lnSpcReduction="10000"/>
+          </a:bodyPr>
           <a:lstStyle/>
           <a:p>
             <a:r>
               <a:rPr lang="en-US" altLang="zh-TW" dirty="0"/>
-              <a:t>In this paper, two architectures are proposed to realize a BLE-based multi-GW network infrastructure that is able to provide bidirectional connectivity to mobile BLE peripherals. </a:t>
+              <a:t>Bluetooth Low Energy (BLE) was released in 2011 as part of the Classic Bluetooth specification and both technologies have coexisted and evolved independently since then.</a:t>
             </a:r>
           </a:p>
           <a:p>
@@ -3727,7 +3921,24 @@
           <a:p>
             <a:r>
               <a:rPr lang="en-US" altLang="zh-TW" dirty="0"/>
-              <a:t>The IP based architecture offers seamless end-to-end IP connectivity between a mobile BLE peripheral and an existing IP network. It limits custom implementation needs, but requires more resources from the already constrained mobile BLE peripheral. </a:t>
+              <a:t>BLE operates in the 2.4 GHz band, utilizing frequencies between 2402 and 2480MHz. The used spectrum is divided into 40 channels, each employing a space of 2 </a:t>
+            </a:r>
+            <a:r>
+              <a:rPr lang="en-US" altLang="zh-TW" dirty="0" err="1"/>
+              <a:t>MHz.</a:t>
+            </a:r>
+            <a:r>
+              <a:rPr lang="en-US" altLang="zh-TW" dirty="0"/>
+              <a:t> These channels are divided into3 primary advertisement channels and 37 connection-oriented channels. </a:t>
+            </a:r>
+          </a:p>
+          <a:p>
+            <a:endParaRPr lang="en-US" altLang="zh-TW" dirty="0"/>
+          </a:p>
+          <a:p>
+            <a:r>
+              <a:rPr lang="en-US" altLang="zh-TW" dirty="0"/>
+              <a:t>BLE supports two different ways of communication : an advertising mode and a connection-oriented mode.</a:t>
             </a:r>
             <a:endParaRPr lang="zh-TW" altLang="en-US" dirty="0"/>
           </a:p>
@@ -3736,7 +3947,7 @@
     </p:spTree>
     <p:extLst>
       <p:ext uri="{BB962C8B-B14F-4D97-AF65-F5344CB8AC3E}">
-        <p14:creationId xmlns:p14="http://schemas.microsoft.com/office/powerpoint/2010/main" val="3047592953"/>
+        <p14:creationId xmlns:p14="http://schemas.microsoft.com/office/powerpoint/2010/main" val="809978483"/>
       </p:ext>
     </p:extLst>
   </p:cSld>
@@ -3768,7 +3979,7 @@
           <p:cNvPr id="2" name="標題 1">
             <a:extLst>
               <a:ext uri="{FF2B5EF4-FFF2-40B4-BE49-F238E27FC236}">
-                <a16:creationId xmlns:a16="http://schemas.microsoft.com/office/drawing/2014/main" id="{B7DB5FDF-E9A2-4D3D-ACF8-CEFDE567ED4E}"/>
+                <a16:creationId xmlns:a16="http://schemas.microsoft.com/office/drawing/2014/main" id="{14B7E57E-D063-41EF-A857-5628A20B75BC}"/>
               </a:ext>
             </a:extLst>
           </p:cNvPr>
@@ -3786,50 +3997,72 @@
           <a:p>
             <a:r>
               <a:rPr lang="en-US" altLang="zh-TW" dirty="0"/>
-              <a:t>Conclusion(cont’d)</a:t>
-            </a:r>
+              <a:t>Primer on BLE and BLE over IPv6(cont’d)</a:t>
+            </a:r>
+          </a:p>
+        </p:txBody>
+      </p:sp>
+      <p:sp>
+        <p:nvSpPr>
+          <p:cNvPr id="3" name="內容版面配置區 2">
+            <a:extLst>
+              <a:ext uri="{FF2B5EF4-FFF2-40B4-BE49-F238E27FC236}">
+                <a16:creationId xmlns:a16="http://schemas.microsoft.com/office/drawing/2014/main" id="{E616DA40-9E29-4C7C-A28F-3857701A0286}"/>
+              </a:ext>
+            </a:extLst>
+          </p:cNvPr>
+          <p:cNvSpPr>
+            <a:spLocks noGrp="1"/>
+          </p:cNvSpPr>
+          <p:nvPr>
+            <p:ph idx="1"/>
+          </p:nvPr>
+        </p:nvSpPr>
+        <p:spPr/>
+        <p:txBody>
+          <a:bodyPr>
+            <a:normAutofit/>
+          </a:bodyPr>
+          <a:lstStyle/>
+          <a:p>
             <a:endParaRPr lang="zh-TW" altLang="en-US" dirty="0"/>
           </a:p>
         </p:txBody>
       </p:sp>
-      <p:sp>
-        <p:nvSpPr>
-          <p:cNvPr id="3" name="內容版面配置區 2">
-            <a:extLst>
-              <a:ext uri="{FF2B5EF4-FFF2-40B4-BE49-F238E27FC236}">
-                <a16:creationId xmlns:a16="http://schemas.microsoft.com/office/drawing/2014/main" id="{24BC7DE2-9247-4111-B9E4-01812FC553D6}"/>
-              </a:ext>
-            </a:extLst>
-          </p:cNvPr>
-          <p:cNvSpPr>
-            <a:spLocks noGrp="1"/>
-          </p:cNvSpPr>
-          <p:nvPr>
-            <p:ph idx="1"/>
-          </p:nvPr>
-        </p:nvSpPr>
-        <p:spPr/>
-        <p:txBody>
-          <a:bodyPr/>
-          <a:lstStyle/>
-          <a:p>
-            <a:r>
-              <a:rPr lang="en-US" altLang="zh-TW" dirty="0"/>
-              <a:t>The non-IP based architecture requires less resources from the BLE peripheral as it employs native BLE communication towards the IoT gateway. However, custom implementation needs are much higher, as a dedicated controller is introduced within the existing network that needs to maintain the state of the infrastructure and the currently associated mobile BLE devices.</a:t>
-            </a:r>
-          </a:p>
-          <a:p>
-            <a:endParaRPr lang="en-US" altLang="zh-TW" dirty="0"/>
-          </a:p>
-          <a:p>
-            <a:endParaRPr lang="zh-TW" altLang="en-US" dirty="0"/>
-          </a:p>
-        </p:txBody>
-      </p:sp>
+      <p:pic>
+        <p:nvPicPr>
+          <p:cNvPr id="7" name="圖片 6">
+            <a:extLst>
+              <a:ext uri="{FF2B5EF4-FFF2-40B4-BE49-F238E27FC236}">
+                <a16:creationId xmlns:a16="http://schemas.microsoft.com/office/drawing/2014/main" id="{D03360D8-0A34-4B9B-8EDF-94EF768549C8}"/>
+              </a:ext>
+            </a:extLst>
+          </p:cNvPr>
+          <p:cNvPicPr>
+            <a:picLocks noChangeAspect="1"/>
+          </p:cNvPicPr>
+          <p:nvPr/>
+        </p:nvPicPr>
+        <p:blipFill>
+          <a:blip r:embed="rId2"/>
+          <a:stretch>
+            <a:fillRect/>
+          </a:stretch>
+        </p:blipFill>
+        <p:spPr>
+          <a:xfrm>
+            <a:off x="4516582" y="4378169"/>
+            <a:ext cx="7675418" cy="2479831"/>
+          </a:xfrm>
+          <a:prstGeom prst="rect">
+            <a:avLst/>
+          </a:prstGeom>
+        </p:spPr>
+      </p:pic>
     </p:spTree>
     <p:extLst>
       <p:ext uri="{BB962C8B-B14F-4D97-AF65-F5344CB8AC3E}">
-        <p14:creationId xmlns:p14="http://schemas.microsoft.com/office/powerpoint/2010/main" val="4005318741"/>
+        <p14:creationId xmlns:p14="http://schemas.microsoft.com/office/powerpoint/2010/main" val="1645637635"/>
       </p:ext>
     </p:extLst>
   </p:cSld>
@@ -3879,7 +4112,7 @@
           <a:p>
             <a:r>
               <a:rPr lang="en-US" altLang="zh-TW" dirty="0"/>
-              <a:t>Conclusion(cont’d)</a:t>
+              <a:t>Conclusion</a:t>
             </a:r>
             <a:endParaRPr lang="zh-TW" altLang="en-US" dirty="0"/>
           </a:p>
@@ -3903,14 +4136,12 @@
         </p:nvSpPr>
         <p:spPr/>
         <p:txBody>
-          <a:bodyPr>
-            <a:normAutofit/>
-          </a:bodyPr>
+          <a:bodyPr/>
           <a:lstStyle/>
           <a:p>
             <a:r>
               <a:rPr lang="en-US" altLang="zh-TW" dirty="0"/>
-              <a:t>Next to this, two approaches are considered to perform handover within these solutions. </a:t>
+              <a:t>In this paper, two architectures are proposed to realize a BLE-based multi-GW network infrastructure that is able to provide bidirectional connectivity to mobile BLE peripherals. </a:t>
             </a:r>
           </a:p>
           <a:p>
@@ -3919,15 +4150,16 @@
           <a:p>
             <a:r>
               <a:rPr lang="en-US" altLang="zh-TW" dirty="0"/>
-              <a:t>The passive handover approach does not need any extra implementation, but the handover latency can become quite high and a bad BLE connection is still maintained even if a better alternative GW is avail-able nearby. </a:t>
-            </a:r>
+              <a:t>The IP based architecture offers seamless end-to-end IP connectivity between a mobile BLE peripheral and an existing IP network. It limits custom implementation needs, but requires more resources from the already constrained mobile BLE peripheral. </a:t>
+            </a:r>
+            <a:endParaRPr lang="zh-TW" altLang="en-US" dirty="0"/>
           </a:p>
         </p:txBody>
       </p:sp>
     </p:spTree>
     <p:extLst>
       <p:ext uri="{BB962C8B-B14F-4D97-AF65-F5344CB8AC3E}">
-        <p14:creationId xmlns:p14="http://schemas.microsoft.com/office/powerpoint/2010/main" val="1788803111"/>
+        <p14:creationId xmlns:p14="http://schemas.microsoft.com/office/powerpoint/2010/main" val="3047592953"/>
       </p:ext>
     </p:extLst>
   </p:cSld>
@@ -4001,15 +4233,18 @@
         </p:nvSpPr>
         <p:spPr/>
         <p:txBody>
-          <a:bodyPr>
-            <a:normAutofit/>
-          </a:bodyPr>
+          <a:bodyPr/>
           <a:lstStyle/>
           <a:p>
             <a:r>
               <a:rPr lang="en-US" altLang="zh-TW" dirty="0"/>
-              <a:t>Active handover offers a solution by proactively terminating a bad connection when a better alternative GW is available. As such, it can limit the handover latency. Asa downside, this approach requires more extensive custom implementation, implies a higher energy consumption and can limit the available throughput.</a:t>
-            </a:r>
+              <a:t>The non-IP based architecture requires less resources from the BLE peripheral as it employs native BLE communication towards the IoT gateway. However, custom implementation needs are much higher, as a dedicated controller is introduced within the existing network that needs to maintain the state of the infrastructure and the currently associated mobile BLE devices.</a:t>
+            </a:r>
+          </a:p>
+          <a:p>
+            <a:endParaRPr lang="en-US" altLang="zh-TW" dirty="0"/>
+          </a:p>
+          <a:p>
             <a:endParaRPr lang="zh-TW" altLang="en-US" dirty="0"/>
           </a:p>
         </p:txBody>
@@ -4017,7 +4252,7 @@
     </p:spTree>
     <p:extLst>
       <p:ext uri="{BB962C8B-B14F-4D97-AF65-F5344CB8AC3E}">
-        <p14:creationId xmlns:p14="http://schemas.microsoft.com/office/powerpoint/2010/main" val="493870139"/>
+        <p14:creationId xmlns:p14="http://schemas.microsoft.com/office/powerpoint/2010/main" val="4005318741"/>
       </p:ext>
     </p:extLst>
   </p:cSld>
@@ -4049,7 +4284,7 @@
           <p:cNvPr id="2" name="標題 1">
             <a:extLst>
               <a:ext uri="{FF2B5EF4-FFF2-40B4-BE49-F238E27FC236}">
-                <a16:creationId xmlns:a16="http://schemas.microsoft.com/office/drawing/2014/main" id="{66BD44E2-EFFF-43D9-A213-DE501B575689}"/>
+                <a16:creationId xmlns:a16="http://schemas.microsoft.com/office/drawing/2014/main" id="{B7DB5FDF-E9A2-4D3D-ACF8-CEFDE567ED4E}"/>
               </a:ext>
             </a:extLst>
           </p:cNvPr>
@@ -4067,7 +4302,7 @@
           <a:p>
             <a:r>
               <a:rPr lang="en-US" altLang="zh-TW" dirty="0"/>
-              <a:t>References</a:t>
+              <a:t>Conclusion(cont’d)</a:t>
             </a:r>
             <a:endParaRPr lang="zh-TW" altLang="en-US" dirty="0"/>
           </a:p>
@@ -4078,7 +4313,7 @@
           <p:cNvPr id="3" name="內容版面配置區 2">
             <a:extLst>
               <a:ext uri="{FF2B5EF4-FFF2-40B4-BE49-F238E27FC236}">
-                <a16:creationId xmlns:a16="http://schemas.microsoft.com/office/drawing/2014/main" id="{6C6870F8-5E25-41B8-BDBD-DC2867167899}"/>
+                <a16:creationId xmlns:a16="http://schemas.microsoft.com/office/drawing/2014/main" id="{24BC7DE2-9247-4111-B9E4-01812FC553D6}"/>
               </a:ext>
             </a:extLst>
           </p:cNvPr>
@@ -4091,77 +4326,121 @@
         </p:nvSpPr>
         <p:spPr/>
         <p:txBody>
-          <a:bodyPr/>
+          <a:bodyPr>
+            <a:normAutofit/>
+          </a:bodyPr>
           <a:lstStyle/>
           <a:p>
             <a:r>
               <a:rPr lang="en-US" altLang="zh-TW" dirty="0"/>
-              <a:t>Mathias </a:t>
-            </a:r>
-            <a:r>
-              <a:rPr lang="en-US" altLang="zh-TW" dirty="0" err="1"/>
-              <a:t>Baert</a:t>
-            </a:r>
+              <a:t>Next to this, two approaches are considered to perform handover within these solutions. </a:t>
+            </a:r>
+          </a:p>
+          <a:p>
+            <a:endParaRPr lang="en-US" altLang="zh-TW" dirty="0"/>
+          </a:p>
+          <a:p>
             <a:r>
               <a:rPr lang="en-US" altLang="zh-TW" dirty="0"/>
-              <a:t>, </a:t>
-            </a:r>
-            <a:r>
-              <a:rPr lang="en-US" altLang="zh-TW" dirty="0" err="1"/>
-              <a:t>Pieterjan</a:t>
-            </a:r>
-            <a:r>
-              <a:rPr lang="en-US" altLang="zh-TW" dirty="0"/>
-              <a:t> </a:t>
-            </a:r>
-            <a:r>
-              <a:rPr lang="en-US" altLang="zh-TW" dirty="0" err="1"/>
-              <a:t>Camerlynck</a:t>
-            </a:r>
-            <a:r>
-              <a:rPr lang="en-US" altLang="zh-TW" dirty="0"/>
-              <a:t>, Pieter </a:t>
-            </a:r>
-            <a:r>
-              <a:rPr lang="en-US" altLang="zh-TW" dirty="0" err="1"/>
-              <a:t>Crombez</a:t>
-            </a:r>
-            <a:r>
-              <a:rPr lang="en-US" altLang="zh-TW" dirty="0"/>
-              <a:t>, Jeroen </a:t>
-            </a:r>
-            <a:r>
-              <a:rPr lang="en-US" altLang="zh-TW" dirty="0" err="1"/>
-              <a:t>Hoebeke</a:t>
-            </a:r>
-            <a:r>
-              <a:rPr lang="en-US" altLang="zh-TW" dirty="0"/>
-              <a:t>, “A BLE-Based Multi-Gateway Network Infrastructure with Handover Support for Mobile BLE Peripherals” in IEEE </a:t>
-            </a:r>
-            <a:r>
-              <a:rPr lang="en-US" altLang="zh-TW" dirty="0" err="1"/>
-              <a:t>Internatonal</a:t>
-            </a:r>
-            <a:r>
-              <a:rPr lang="en-US" altLang="zh-TW" dirty="0"/>
-              <a:t> Conference on Mobile </a:t>
-            </a:r>
-            <a:r>
-              <a:rPr lang="en-US" altLang="zh-TW" dirty="0" err="1"/>
-              <a:t>Adhoc</a:t>
-            </a:r>
-            <a:r>
-              <a:rPr lang="en-US" altLang="zh-TW" dirty="0"/>
-              <a:t> and Sensor Systems (MASS) , DOI: 10.1109/MASS.2019.00020</a:t>
-            </a:r>
-            <a:endParaRPr lang="zh-TW" altLang="en-US" dirty="0"/>
+              <a:t>The passive handover approach does not need any extra implementation, but the handover latency can become quite high and a bad BLE connection is still maintained even if a better alternative GW is avail-able nearby. </a:t>
+            </a:r>
           </a:p>
         </p:txBody>
       </p:sp>
     </p:spTree>
     <p:extLst>
       <p:ext uri="{BB962C8B-B14F-4D97-AF65-F5344CB8AC3E}">
-        <p14:creationId xmlns:p14="http://schemas.microsoft.com/office/powerpoint/2010/main" val="2779116832"/>
+        <p14:creationId xmlns:p14="http://schemas.microsoft.com/office/powerpoint/2010/main" val="1788803111"/>
+      </p:ext>
+    </p:extLst>
+  </p:cSld>
+  <p:clrMapOvr>
+    <a:masterClrMapping/>
+  </p:clrMapOvr>
+</p:sld>
+</file>
+
+<file path=ppt/slides/slide9.xml><?xml version="1.0" encoding="utf-8"?>
+<p:sld xmlns:a="http://schemas.openxmlformats.org/drawingml/2006/main" xmlns:r="http://schemas.openxmlformats.org/officeDocument/2006/relationships" xmlns:p="http://schemas.openxmlformats.org/presentationml/2006/main">
+  <p:cSld>
+    <p:spTree>
+      <p:nvGrpSpPr>
+        <p:cNvPr id="1" name=""/>
+        <p:cNvGrpSpPr/>
+        <p:nvPr/>
+      </p:nvGrpSpPr>
+      <p:grpSpPr>
+        <a:xfrm>
+          <a:off x="0" y="0"/>
+          <a:ext cx="0" cy="0"/>
+          <a:chOff x="0" y="0"/>
+          <a:chExt cx="0" cy="0"/>
+        </a:xfrm>
+      </p:grpSpPr>
+      <p:sp>
+        <p:nvSpPr>
+          <p:cNvPr id="2" name="標題 1">
+            <a:extLst>
+              <a:ext uri="{FF2B5EF4-FFF2-40B4-BE49-F238E27FC236}">
+                <a16:creationId xmlns:a16="http://schemas.microsoft.com/office/drawing/2014/main" id="{B7DB5FDF-E9A2-4D3D-ACF8-CEFDE567ED4E}"/>
+              </a:ext>
+            </a:extLst>
+          </p:cNvPr>
+          <p:cNvSpPr>
+            <a:spLocks noGrp="1"/>
+          </p:cNvSpPr>
+          <p:nvPr>
+            <p:ph type="title"/>
+          </p:nvPr>
+        </p:nvSpPr>
+        <p:spPr/>
+        <p:txBody>
+          <a:bodyPr/>
+          <a:lstStyle/>
+          <a:p>
+            <a:r>
+              <a:rPr lang="en-US" altLang="zh-TW" dirty="0"/>
+              <a:t>Conclusion(cont’d)</a:t>
+            </a:r>
+            <a:endParaRPr lang="zh-TW" altLang="en-US" dirty="0"/>
+          </a:p>
+        </p:txBody>
+      </p:sp>
+      <p:sp>
+        <p:nvSpPr>
+          <p:cNvPr id="3" name="內容版面配置區 2">
+            <a:extLst>
+              <a:ext uri="{FF2B5EF4-FFF2-40B4-BE49-F238E27FC236}">
+                <a16:creationId xmlns:a16="http://schemas.microsoft.com/office/drawing/2014/main" id="{24BC7DE2-9247-4111-B9E4-01812FC553D6}"/>
+              </a:ext>
+            </a:extLst>
+          </p:cNvPr>
+          <p:cNvSpPr>
+            <a:spLocks noGrp="1"/>
+          </p:cNvSpPr>
+          <p:nvPr>
+            <p:ph idx="1"/>
+          </p:nvPr>
+        </p:nvSpPr>
+        <p:spPr/>
+        <p:txBody>
+          <a:bodyPr>
+            <a:normAutofit/>
+          </a:bodyPr>
+          <a:lstStyle/>
+          <a:p>
+            <a:r>
+              <a:rPr lang="en-US" altLang="zh-TW" dirty="0"/>
+              <a:t>Active handover offers a solution by proactively terminating a bad connection when a better alternative GW is available. As such, it can limit the handover latency. Asa downside, this approach requires more extensive custom implementation, implies a higher energy consumption and can limit the available throughput.</a:t>
+            </a:r>
+            <a:endParaRPr lang="zh-TW" altLang="en-US" dirty="0"/>
+          </a:p>
+        </p:txBody>
+      </p:sp>
+    </p:spTree>
+    <p:extLst>
+      <p:ext uri="{BB962C8B-B14F-4D97-AF65-F5344CB8AC3E}">
+        <p14:creationId xmlns:p14="http://schemas.microsoft.com/office/powerpoint/2010/main" val="493870139"/>
       </p:ext>
     </p:extLst>
   </p:cSld>

</xml_diff>